<commit_message>
Corretto errore di scrittura
</commit_message>
<xml_diff>
--- a/PresentazioneApp.pptx
+++ b/PresentazioneApp.pptx
@@ -14245,11 +14245,15 @@
             </a:r>
             <a:r>
               <a:rPr lang="en-US" sz="3600" dirty="0" err="1" smtClean="0"/>
-              <a:t>voloce</a:t>
+              <a:t>veloce</a:t>
             </a:r>
             <a:r>
               <a:rPr lang="en-US" sz="3600" dirty="0" smtClean="0"/>
-              <a:t> da </a:t>
+              <a:t> </a:t>
+            </a:r>
+            <a:r>
+              <a:rPr lang="en-US" sz="3600" dirty="0" smtClean="0"/>
+              <a:t>da </a:t>
             </a:r>
             <a:r>
               <a:rPr lang="en-US" sz="3600" dirty="0" err="1" smtClean="0"/>
@@ -19036,7 +19040,7 @@
   <a:extraClrSchemeLst/>
   <a:extLst>
     <a:ext uri="{05A4C25C-085E-4340-85A3-A5531E510DB2}">
-      <thm15:themeFamily xmlns:thm15="http://schemas.microsoft.com/office/thememl/2012/main" xmlns="" name="Circuit" id="{0AC2F7E7-15F5-431C-B2A2-456FE929F56C}" vid="{0911B802-464C-4241-8DD9-B60FF88E379F}"/>
+      <thm15:themeFamily xmlns="" xmlns:thm15="http://schemas.microsoft.com/office/thememl/2012/main" name="Circuit" id="{0AC2F7E7-15F5-431C-B2A2-456FE929F56C}" vid="{0911B802-464C-4241-8DD9-B60FF88E379F}"/>
     </a:ext>
   </a:extLst>
 </a:theme>

</xml_diff>